<commit_message>
Adding joint account functionality
</commit_message>
<xml_diff>
--- a/Project0 Presentation.pptx
+++ b/Project0 Presentation.pptx
@@ -7,6 +7,9 @@
   <p:sldIdLst>
     <p:sldId id="256" r:id="rId2"/>
     <p:sldId id="257" r:id="rId3"/>
+    <p:sldId id="258" r:id="rId4"/>
+    <p:sldId id="259" r:id="rId5"/>
+    <p:sldId id="260" r:id="rId6"/>
   </p:sldIdLst>
   <p:sldSz cx="12192000" cy="6858000"/>
   <p:notesSz cx="6858000" cy="9144000"/>
@@ -105,6 +108,11 @@
       </a:defRPr>
     </a:lvl9pPr>
   </p:defaultTextStyle>
+  <p:extLst>
+    <p:ext uri="{EFAFB233-063F-42B5-8137-9DF3F51BA10A}">
+      <p15:sldGuideLst xmlns:p15="http://schemas.microsoft.com/office/powerpoint/2012/main"/>
+    </p:ext>
+  </p:extLst>
 </p:presentation>
 </file>
 
@@ -255,7 +263,7 @@
           <a:p>
             <a:fld id="{FD18CA1B-9FAD-4A73-93DD-14B34C54306A}" type="datetimeFigureOut">
               <a:rPr lang="en-US" smtClean="0"/>
-              <a:t>10/10/2021</a:t>
+              <a:t>10/11/2021</a:t>
             </a:fld>
             <a:endParaRPr lang="en-US"/>
           </a:p>
@@ -453,7 +461,7 @@
           <a:p>
             <a:fld id="{FD18CA1B-9FAD-4A73-93DD-14B34C54306A}" type="datetimeFigureOut">
               <a:rPr lang="en-US" smtClean="0"/>
-              <a:t>10/10/2021</a:t>
+              <a:t>10/11/2021</a:t>
             </a:fld>
             <a:endParaRPr lang="en-US"/>
           </a:p>
@@ -661,7 +669,7 @@
           <a:p>
             <a:fld id="{FD18CA1B-9FAD-4A73-93DD-14B34C54306A}" type="datetimeFigureOut">
               <a:rPr lang="en-US" smtClean="0"/>
-              <a:t>10/10/2021</a:t>
+              <a:t>10/11/2021</a:t>
             </a:fld>
             <a:endParaRPr lang="en-US"/>
           </a:p>
@@ -859,7 +867,7 @@
           <a:p>
             <a:fld id="{FD18CA1B-9FAD-4A73-93DD-14B34C54306A}" type="datetimeFigureOut">
               <a:rPr lang="en-US" smtClean="0"/>
-              <a:t>10/10/2021</a:t>
+              <a:t>10/11/2021</a:t>
             </a:fld>
             <a:endParaRPr lang="en-US"/>
           </a:p>
@@ -1134,7 +1142,7 @@
           <a:p>
             <a:fld id="{FD18CA1B-9FAD-4A73-93DD-14B34C54306A}" type="datetimeFigureOut">
               <a:rPr lang="en-US" smtClean="0"/>
-              <a:t>10/10/2021</a:t>
+              <a:t>10/11/2021</a:t>
             </a:fld>
             <a:endParaRPr lang="en-US"/>
           </a:p>
@@ -1399,7 +1407,7 @@
           <a:p>
             <a:fld id="{FD18CA1B-9FAD-4A73-93DD-14B34C54306A}" type="datetimeFigureOut">
               <a:rPr lang="en-US" smtClean="0"/>
-              <a:t>10/10/2021</a:t>
+              <a:t>10/11/2021</a:t>
             </a:fld>
             <a:endParaRPr lang="en-US"/>
           </a:p>
@@ -1811,7 +1819,7 @@
           <a:p>
             <a:fld id="{FD18CA1B-9FAD-4A73-93DD-14B34C54306A}" type="datetimeFigureOut">
               <a:rPr lang="en-US" smtClean="0"/>
-              <a:t>10/10/2021</a:t>
+              <a:t>10/11/2021</a:t>
             </a:fld>
             <a:endParaRPr lang="en-US"/>
           </a:p>
@@ -1952,7 +1960,7 @@
           <a:p>
             <a:fld id="{FD18CA1B-9FAD-4A73-93DD-14B34C54306A}" type="datetimeFigureOut">
               <a:rPr lang="en-US" smtClean="0"/>
-              <a:t>10/10/2021</a:t>
+              <a:t>10/11/2021</a:t>
             </a:fld>
             <a:endParaRPr lang="en-US"/>
           </a:p>
@@ -2065,7 +2073,7 @@
           <a:p>
             <a:fld id="{FD18CA1B-9FAD-4A73-93DD-14B34C54306A}" type="datetimeFigureOut">
               <a:rPr lang="en-US" smtClean="0"/>
-              <a:t>10/10/2021</a:t>
+              <a:t>10/11/2021</a:t>
             </a:fld>
             <a:endParaRPr lang="en-US"/>
           </a:p>
@@ -2376,7 +2384,7 @@
           <a:p>
             <a:fld id="{FD18CA1B-9FAD-4A73-93DD-14B34C54306A}" type="datetimeFigureOut">
               <a:rPr lang="en-US" smtClean="0"/>
-              <a:t>10/10/2021</a:t>
+              <a:t>10/11/2021</a:t>
             </a:fld>
             <a:endParaRPr lang="en-US"/>
           </a:p>
@@ -2664,7 +2672,7 @@
           <a:p>
             <a:fld id="{FD18CA1B-9FAD-4A73-93DD-14B34C54306A}" type="datetimeFigureOut">
               <a:rPr lang="en-US" smtClean="0"/>
-              <a:t>10/10/2021</a:t>
+              <a:t>10/11/2021</a:t>
             </a:fld>
             <a:endParaRPr lang="en-US"/>
           </a:p>
@@ -2905,7 +2913,7 @@
           <a:p>
             <a:fld id="{FD18CA1B-9FAD-4A73-93DD-14B34C54306A}" type="datetimeFigureOut">
               <a:rPr lang="en-US" smtClean="0"/>
-              <a:t>10/10/2021</a:t>
+              <a:t>10/11/2021</a:t>
             </a:fld>
             <a:endParaRPr lang="en-US"/>
           </a:p>
@@ -3429,7 +3437,10 @@
           <a:bodyPr/>
           <a:lstStyle/>
           <a:p>
-            <a:endParaRPr lang="en-US"/>
+            <a:r>
+              <a:rPr lang="en-US" dirty="0"/>
+              <a:t>Functionalities</a:t>
+            </a:r>
           </a:p>
         </p:txBody>
       </p:sp>
@@ -3454,7 +3465,52 @@
           <a:bodyPr/>
           <a:lstStyle/>
           <a:p>
-            <a:endParaRPr lang="en-US"/>
+            <a:r>
+              <a:rPr lang="en-US" dirty="0"/>
+              <a:t>Banking application with three levels of users</a:t>
+            </a:r>
+          </a:p>
+          <a:p>
+            <a:pPr lvl="1"/>
+            <a:r>
+              <a:rPr lang="en-US" dirty="0"/>
+              <a:t>Customers </a:t>
+            </a:r>
+          </a:p>
+          <a:p>
+            <a:pPr lvl="2"/>
+            <a:r>
+              <a:rPr lang="en-US" dirty="0"/>
+              <a:t>Deposit, withdraw, transfer, request an account/joint account, possess multiple accounts</a:t>
+            </a:r>
+          </a:p>
+          <a:p>
+            <a:pPr lvl="1"/>
+            <a:r>
+              <a:rPr lang="en-US" dirty="0"/>
+              <a:t>Teller</a:t>
+            </a:r>
+          </a:p>
+          <a:p>
+            <a:pPr lvl="2"/>
+            <a:r>
+              <a:rPr lang="en-US" dirty="0"/>
+              <a:t>View all customer accounts, deposit, withdraw, transfer from any account</a:t>
+            </a:r>
+          </a:p>
+          <a:p>
+            <a:pPr lvl="1"/>
+            <a:r>
+              <a:rPr lang="en-US" dirty="0"/>
+              <a:t>Manager</a:t>
+            </a:r>
+          </a:p>
+          <a:p>
+            <a:pPr lvl="2"/>
+            <a:r>
+              <a:rPr lang="en-US" dirty="0"/>
+              <a:t>All teller privileges + accept/deny account requests, delete accounts </a:t>
+            </a:r>
           </a:p>
         </p:txBody>
       </p:sp>
@@ -3462,6 +3518,377 @@
     <p:extLst>
       <p:ext uri="{BB962C8B-B14F-4D97-AF65-F5344CB8AC3E}">
         <p14:creationId xmlns:p14="http://schemas.microsoft.com/office/powerpoint/2010/main" val="1702965828"/>
+      </p:ext>
+    </p:extLst>
+  </p:cSld>
+  <p:clrMapOvr>
+    <a:masterClrMapping/>
+  </p:clrMapOvr>
+</p:sld>
+</file>
+
+<file path=ppt/slides/slide3.xml><?xml version="1.0" encoding="utf-8"?>
+<p:sld xmlns:a="http://schemas.openxmlformats.org/drawingml/2006/main" xmlns:r="http://schemas.openxmlformats.org/officeDocument/2006/relationships" xmlns:p="http://schemas.openxmlformats.org/presentationml/2006/main">
+  <p:cSld>
+    <p:spTree>
+      <p:nvGrpSpPr>
+        <p:cNvPr id="1" name=""/>
+        <p:cNvGrpSpPr/>
+        <p:nvPr/>
+      </p:nvGrpSpPr>
+      <p:grpSpPr>
+        <a:xfrm>
+          <a:off x="0" y="0"/>
+          <a:ext cx="0" cy="0"/>
+          <a:chOff x="0" y="0"/>
+          <a:chExt cx="0" cy="0"/>
+        </a:xfrm>
+      </p:grpSpPr>
+      <p:sp>
+        <p:nvSpPr>
+          <p:cNvPr id="2" name="Title 1">
+            <a:extLst>
+              <a:ext uri="{FF2B5EF4-FFF2-40B4-BE49-F238E27FC236}">
+                <a16:creationId xmlns:a16="http://schemas.microsoft.com/office/drawing/2014/main" id="{E50B02A5-776B-43C0-9669-D86224DC5867}"/>
+              </a:ext>
+            </a:extLst>
+          </p:cNvPr>
+          <p:cNvSpPr>
+            <a:spLocks noGrp="1"/>
+          </p:cNvSpPr>
+          <p:nvPr>
+            <p:ph type="title"/>
+          </p:nvPr>
+        </p:nvSpPr>
+        <p:spPr/>
+        <p:txBody>
+          <a:bodyPr/>
+          <a:lstStyle/>
+          <a:p>
+            <a:r>
+              <a:rPr lang="en-US" dirty="0"/>
+              <a:t>Additional Functionalities</a:t>
+            </a:r>
+          </a:p>
+        </p:txBody>
+      </p:sp>
+      <p:sp>
+        <p:nvSpPr>
+          <p:cNvPr id="3" name="Content Placeholder 2">
+            <a:extLst>
+              <a:ext uri="{FF2B5EF4-FFF2-40B4-BE49-F238E27FC236}">
+                <a16:creationId xmlns:a16="http://schemas.microsoft.com/office/drawing/2014/main" id="{EDCD0977-26D1-4489-BC26-DB25239B0F40}"/>
+              </a:ext>
+            </a:extLst>
+          </p:cNvPr>
+          <p:cNvSpPr>
+            <a:spLocks noGrp="1"/>
+          </p:cNvSpPr>
+          <p:nvPr>
+            <p:ph idx="1"/>
+          </p:nvPr>
+        </p:nvSpPr>
+        <p:spPr/>
+        <p:txBody>
+          <a:bodyPr/>
+          <a:lstStyle/>
+          <a:p>
+            <a:r>
+              <a:rPr lang="en-US" dirty="0"/>
+              <a:t>Registration</a:t>
+            </a:r>
+          </a:p>
+          <a:p>
+            <a:pPr lvl="1"/>
+            <a:r>
+              <a:rPr lang="en-US" dirty="0"/>
+              <a:t>Customers can register for login account</a:t>
+            </a:r>
+          </a:p>
+          <a:p>
+            <a:r>
+              <a:rPr lang="en-US" dirty="0"/>
+              <a:t>Input validation</a:t>
+            </a:r>
+          </a:p>
+          <a:p>
+            <a:pPr lvl="1"/>
+            <a:r>
+              <a:rPr lang="en-US" dirty="0"/>
+              <a:t>Input validation for all fields, unit of currency is gold coins (integer)</a:t>
+            </a:r>
+          </a:p>
+          <a:p>
+            <a:r>
+              <a:rPr lang="en-US" dirty="0"/>
+              <a:t>Password encryption</a:t>
+            </a:r>
+          </a:p>
+        </p:txBody>
+      </p:sp>
+    </p:spTree>
+    <p:extLst>
+      <p:ext uri="{BB962C8B-B14F-4D97-AF65-F5344CB8AC3E}">
+        <p14:creationId xmlns:p14="http://schemas.microsoft.com/office/powerpoint/2010/main" val="1599253632"/>
+      </p:ext>
+    </p:extLst>
+  </p:cSld>
+  <p:clrMapOvr>
+    <a:masterClrMapping/>
+  </p:clrMapOvr>
+</p:sld>
+</file>
+
+<file path=ppt/slides/slide4.xml><?xml version="1.0" encoding="utf-8"?>
+<p:sld xmlns:a="http://schemas.openxmlformats.org/drawingml/2006/main" xmlns:r="http://schemas.openxmlformats.org/officeDocument/2006/relationships" xmlns:p="http://schemas.openxmlformats.org/presentationml/2006/main">
+  <p:cSld>
+    <p:spTree>
+      <p:nvGrpSpPr>
+        <p:cNvPr id="1" name=""/>
+        <p:cNvGrpSpPr/>
+        <p:nvPr/>
+      </p:nvGrpSpPr>
+      <p:grpSpPr>
+        <a:xfrm>
+          <a:off x="0" y="0"/>
+          <a:ext cx="0" cy="0"/>
+          <a:chOff x="0" y="0"/>
+          <a:chExt cx="0" cy="0"/>
+        </a:xfrm>
+      </p:grpSpPr>
+      <p:sp>
+        <p:nvSpPr>
+          <p:cNvPr id="2" name="Title 1">
+            <a:extLst>
+              <a:ext uri="{FF2B5EF4-FFF2-40B4-BE49-F238E27FC236}">
+                <a16:creationId xmlns:a16="http://schemas.microsoft.com/office/drawing/2014/main" id="{1EB43242-2F17-4155-89C0-1E39F2D8C658}"/>
+              </a:ext>
+            </a:extLst>
+          </p:cNvPr>
+          <p:cNvSpPr>
+            <a:spLocks noGrp="1"/>
+          </p:cNvSpPr>
+          <p:nvPr>
+            <p:ph type="title"/>
+          </p:nvPr>
+        </p:nvSpPr>
+        <p:spPr/>
+        <p:txBody>
+          <a:bodyPr/>
+          <a:lstStyle/>
+          <a:p>
+            <a:r>
+              <a:rPr lang="en-US" dirty="0"/>
+              <a:t>Project Design</a:t>
+            </a:r>
+          </a:p>
+        </p:txBody>
+      </p:sp>
+      <p:sp>
+        <p:nvSpPr>
+          <p:cNvPr id="3" name="Content Placeholder 2">
+            <a:extLst>
+              <a:ext uri="{FF2B5EF4-FFF2-40B4-BE49-F238E27FC236}">
+                <a16:creationId xmlns:a16="http://schemas.microsoft.com/office/drawing/2014/main" id="{FFDABB8A-CA5F-4C4F-A9BB-16E888D4AC23}"/>
+              </a:ext>
+            </a:extLst>
+          </p:cNvPr>
+          <p:cNvSpPr>
+            <a:spLocks noGrp="1"/>
+          </p:cNvSpPr>
+          <p:nvPr>
+            <p:ph idx="1"/>
+          </p:nvPr>
+        </p:nvSpPr>
+        <p:spPr/>
+        <p:txBody>
+          <a:bodyPr/>
+          <a:lstStyle/>
+          <a:p>
+            <a:r>
+              <a:rPr lang="en-US" dirty="0"/>
+              <a:t>Maven Project</a:t>
+            </a:r>
+          </a:p>
+          <a:p>
+            <a:pPr lvl="1"/>
+            <a:r>
+              <a:rPr lang="en-US" dirty="0"/>
+              <a:t>Dependency manager</a:t>
+            </a:r>
+          </a:p>
+          <a:p>
+            <a:pPr lvl="2"/>
+            <a:r>
+              <a:rPr lang="en-US" dirty="0"/>
+              <a:t>-Junit, </a:t>
+            </a:r>
+          </a:p>
+          <a:p>
+            <a:r>
+              <a:rPr lang="en-US" dirty="0"/>
+              <a:t>3 Layer architecture organization</a:t>
+            </a:r>
+          </a:p>
+          <a:p>
+            <a:pPr lvl="1"/>
+            <a:r>
+              <a:rPr lang="en-US" dirty="0"/>
+              <a:t>Controller</a:t>
+            </a:r>
+          </a:p>
+          <a:p>
+            <a:pPr lvl="2"/>
+            <a:r>
+              <a:rPr lang="en-US" dirty="0"/>
+              <a:t>Contains menus to interface with user and allow input selection</a:t>
+            </a:r>
+          </a:p>
+          <a:p>
+            <a:pPr lvl="1"/>
+            <a:r>
+              <a:rPr lang="en-US" dirty="0"/>
+              <a:t>Services</a:t>
+            </a:r>
+          </a:p>
+          <a:p>
+            <a:pPr lvl="2"/>
+            <a:r>
+              <a:rPr lang="en-US" dirty="0"/>
+              <a:t>Contain business logic to manage transactions</a:t>
+            </a:r>
+          </a:p>
+          <a:p>
+            <a:pPr lvl="1"/>
+            <a:r>
+              <a:rPr lang="en-US" dirty="0"/>
+              <a:t>DAO</a:t>
+            </a:r>
+          </a:p>
+          <a:p>
+            <a:pPr lvl="2"/>
+            <a:r>
+              <a:rPr lang="en-US" dirty="0"/>
+              <a:t>Manages database connectivity</a:t>
+            </a:r>
+          </a:p>
+        </p:txBody>
+      </p:sp>
+    </p:spTree>
+    <p:extLst>
+      <p:ext uri="{BB962C8B-B14F-4D97-AF65-F5344CB8AC3E}">
+        <p14:creationId xmlns:p14="http://schemas.microsoft.com/office/powerpoint/2010/main" val="3124026992"/>
+      </p:ext>
+    </p:extLst>
+  </p:cSld>
+  <p:clrMapOvr>
+    <a:masterClrMapping/>
+  </p:clrMapOvr>
+</p:sld>
+</file>
+
+<file path=ppt/slides/slide5.xml><?xml version="1.0" encoding="utf-8"?>
+<p:sld xmlns:a="http://schemas.openxmlformats.org/drawingml/2006/main" xmlns:r="http://schemas.openxmlformats.org/officeDocument/2006/relationships" xmlns:p="http://schemas.openxmlformats.org/presentationml/2006/main">
+  <p:cSld>
+    <p:spTree>
+      <p:nvGrpSpPr>
+        <p:cNvPr id="1" name=""/>
+        <p:cNvGrpSpPr/>
+        <p:nvPr/>
+      </p:nvGrpSpPr>
+      <p:grpSpPr>
+        <a:xfrm>
+          <a:off x="0" y="0"/>
+          <a:ext cx="0" cy="0"/>
+          <a:chOff x="0" y="0"/>
+          <a:chExt cx="0" cy="0"/>
+        </a:xfrm>
+      </p:grpSpPr>
+      <p:sp>
+        <p:nvSpPr>
+          <p:cNvPr id="2" name="Title 1">
+            <a:extLst>
+              <a:ext uri="{FF2B5EF4-FFF2-40B4-BE49-F238E27FC236}">
+                <a16:creationId xmlns:a16="http://schemas.microsoft.com/office/drawing/2014/main" id="{07008D89-A202-4128-80FC-B5F33D388BAF}"/>
+              </a:ext>
+            </a:extLst>
+          </p:cNvPr>
+          <p:cNvSpPr>
+            <a:spLocks noGrp="1"/>
+          </p:cNvSpPr>
+          <p:nvPr>
+            <p:ph type="title"/>
+          </p:nvPr>
+        </p:nvSpPr>
+        <p:spPr/>
+        <p:txBody>
+          <a:bodyPr/>
+          <a:lstStyle/>
+          <a:p>
+            <a:r>
+              <a:rPr lang="en-US" dirty="0"/>
+              <a:t>Additional Design Features</a:t>
+            </a:r>
+          </a:p>
+        </p:txBody>
+      </p:sp>
+      <p:sp>
+        <p:nvSpPr>
+          <p:cNvPr id="3" name="Content Placeholder 2">
+            <a:extLst>
+              <a:ext uri="{FF2B5EF4-FFF2-40B4-BE49-F238E27FC236}">
+                <a16:creationId xmlns:a16="http://schemas.microsoft.com/office/drawing/2014/main" id="{ECC2CD6B-1001-49B6-B5E4-D096C80A3CA8}"/>
+              </a:ext>
+            </a:extLst>
+          </p:cNvPr>
+          <p:cNvSpPr>
+            <a:spLocks noGrp="1"/>
+          </p:cNvSpPr>
+          <p:nvPr>
+            <p:ph idx="1"/>
+          </p:nvPr>
+        </p:nvSpPr>
+        <p:spPr/>
+        <p:txBody>
+          <a:bodyPr/>
+          <a:lstStyle/>
+          <a:p>
+            <a:r>
+              <a:rPr lang="en-US" dirty="0"/>
+              <a:t>Contains Junit testing for methods in </a:t>
+            </a:r>
+            <a:r>
+              <a:rPr lang="en-US"/>
+              <a:t>service layer</a:t>
+            </a:r>
+          </a:p>
+          <a:p>
+            <a:pPr lvl="1"/>
+            <a:endParaRPr lang="en-US" dirty="0"/>
+          </a:p>
+          <a:p>
+            <a:r>
+              <a:rPr lang="en-US" dirty="0" err="1"/>
+              <a:t>Logback</a:t>
+            </a:r>
+            <a:r>
+              <a:rPr lang="en-US" dirty="0"/>
+              <a:t> to log user interactions with database</a:t>
+            </a:r>
+          </a:p>
+          <a:p>
+            <a:pPr lvl="1"/>
+            <a:r>
+              <a:rPr lang="en-US" dirty="0"/>
+              <a:t>Creates log messages for invalid inputs, overdraw attempts, and exiting program</a:t>
+            </a:r>
+          </a:p>
+        </p:txBody>
+      </p:sp>
+    </p:spTree>
+    <p:extLst>
+      <p:ext uri="{BB962C8B-B14F-4D97-AF65-F5344CB8AC3E}">
+        <p14:creationId xmlns:p14="http://schemas.microsoft.com/office/powerpoint/2010/main" val="1778995525"/>
       </p:ext>
     </p:extLst>
   </p:cSld>

</xml_diff>